<commit_message>
Leaks section information leak bug classes
* Added UAF read with diagrams

* Added uninitialized memory with diagrams

* Still need to create the example leak program and the heap feng shui sections
</commit_message>
<xml_diff>
--- a/challenges/unlink/Unlink.pptx
+++ b/challenges/unlink/Unlink.pptx
@@ -22172,7 +22172,7 @@
           <a:p>
             <a:fld id="{2DA23E8D-1792-1541-9147-970A8DD8A355}" type="datetimeFigureOut">
               <a:rPr lang="en-US" smtClean="0"/>
-              <a:t>4/6/21</a:t>
+              <a:t>5/25/21</a:t>
             </a:fld>
             <a:endParaRPr lang="en-US" dirty="0"/>
           </a:p>
@@ -22642,7 +22642,7 @@
                 <a:latin typeface="Calibri"/>
               </a:rPr>
               <a:pPr/>
-              <a:t>4/6/21</a:t>
+              <a:t>5/25/21</a:t>
             </a:fld>
             <a:endParaRPr lang="en-US" dirty="0">
               <a:solidFill>
@@ -22895,7 +22895,7 @@
                 <a:latin typeface="Calibri"/>
               </a:rPr>
               <a:pPr/>
-              <a:t>4/6/21</a:t>
+              <a:t>5/25/21</a:t>
             </a:fld>
             <a:endParaRPr lang="en-US" dirty="0">
               <a:solidFill>
@@ -23110,7 +23110,7 @@
                 <a:latin typeface="Calibri"/>
               </a:rPr>
               <a:pPr/>
-              <a:t>4/6/21</a:t>
+              <a:t>5/25/21</a:t>
             </a:fld>
             <a:endParaRPr lang="en-US" dirty="0">
               <a:solidFill>
@@ -23508,7 +23508,7 @@
                 <a:latin typeface="Calibri"/>
               </a:rPr>
               <a:pPr/>
-              <a:t>4/6/21</a:t>
+              <a:t>5/25/21</a:t>
             </a:fld>
             <a:endParaRPr lang="en-US" dirty="0">
               <a:solidFill>
@@ -23850,7 +23850,7 @@
                 <a:latin typeface="Calibri"/>
               </a:rPr>
               <a:pPr/>
-              <a:t>4/6/21</a:t>
+              <a:t>5/25/21</a:t>
             </a:fld>
             <a:endParaRPr lang="en-US" dirty="0">
               <a:solidFill>
@@ -24178,7 +24178,7 @@
                 <a:latin typeface="Calibri"/>
               </a:rPr>
               <a:pPr/>
-              <a:t>4/6/21</a:t>
+              <a:t>5/25/21</a:t>
             </a:fld>
             <a:endParaRPr lang="en-US" dirty="0">
               <a:solidFill>
@@ -24667,7 +24667,7 @@
                 <a:latin typeface="Calibri"/>
               </a:rPr>
               <a:pPr/>
-              <a:t>4/6/21</a:t>
+              <a:t>5/25/21</a:t>
             </a:fld>
             <a:endParaRPr lang="en-US" dirty="0">
               <a:solidFill>
@@ -24850,7 +24850,7 @@
                 <a:latin typeface="Calibri"/>
               </a:rPr>
               <a:pPr/>
-              <a:t>4/6/21</a:t>
+              <a:t>5/25/21</a:t>
             </a:fld>
             <a:endParaRPr lang="en-US" dirty="0">
               <a:solidFill>
@@ -25096,7 +25096,7 @@
                 <a:latin typeface="Calibri"/>
               </a:rPr>
               <a:pPr/>
-              <a:t>4/6/21</a:t>
+              <a:t>5/25/21</a:t>
             </a:fld>
             <a:endParaRPr lang="en-US" dirty="0">
               <a:solidFill>
@@ -25438,7 +25438,7 @@
                 <a:latin typeface="Calibri"/>
               </a:rPr>
               <a:pPr/>
-              <a:t>4/6/21</a:t>
+              <a:t>5/25/21</a:t>
             </a:fld>
             <a:endParaRPr lang="en-US" dirty="0">
               <a:solidFill>
@@ -25730,7 +25730,7 @@
                 <a:latin typeface="Calibri"/>
               </a:rPr>
               <a:pPr/>
-              <a:t>4/6/21</a:t>
+              <a:t>5/25/21</a:t>
             </a:fld>
             <a:endParaRPr lang="en-US" dirty="0">
               <a:solidFill>
@@ -25980,7 +25980,7 @@
                 <a:latin typeface="Calibri"/>
               </a:rPr>
               <a:pPr defTabSz="914400"/>
-              <a:t>4/6/21</a:t>
+              <a:t>5/25/21</a:t>
             </a:fld>
             <a:endParaRPr lang="en-US" dirty="0">
               <a:solidFill>
@@ -44714,37 +44714,6 @@
       </p:sp>
       <p:pic>
         <p:nvPicPr>
-          <p:cNvPr id="13" name="Content Placeholder 4" descr="Unlink Mitigation">
-            <a:extLst>
-              <a:ext uri="{FF2B5EF4-FFF2-40B4-BE49-F238E27FC236}">
-                <a16:creationId xmlns:a16="http://schemas.microsoft.com/office/drawing/2014/main" id="{E2D7F700-5AD9-E749-A930-4450D98053D2}"/>
-              </a:ext>
-            </a:extLst>
-          </p:cNvPr>
-          <p:cNvPicPr>
-            <a:picLocks noChangeAspect="1"/>
-          </p:cNvPicPr>
-          <p:nvPr/>
-        </p:nvPicPr>
-        <p:blipFill>
-          <a:blip r:embed="rId2"/>
-          <a:stretch>
-            <a:fillRect/>
-          </a:stretch>
-        </p:blipFill>
-        <p:spPr>
-          <a:xfrm>
-            <a:off x="2195582" y="3995951"/>
-            <a:ext cx="6892446" cy="1120021"/>
-          </a:xfrm>
-          <a:prstGeom prst="rect">
-            <a:avLst/>
-          </a:prstGeom>
-          <a:noFill/>
-        </p:spPr>
-      </p:pic>
-      <p:pic>
-        <p:nvPicPr>
           <p:cNvPr id="6" name="Content Placeholder 5" descr="Overwrite the pointer itself">
             <a:extLst>
               <a:ext uri="{FF2B5EF4-FFF2-40B4-BE49-F238E27FC236}">
@@ -44760,7 +44729,7 @@
           </p:nvPr>
         </p:nvPicPr>
         <p:blipFill>
-          <a:blip r:embed="rId3"/>
+          <a:blip r:embed="rId2"/>
           <a:stretch>
             <a:fillRect/>
           </a:stretch>
@@ -44770,6 +44739,37 @@
             <a:off x="335830" y="1091374"/>
             <a:ext cx="3972220" cy="3182422"/>
           </a:xfrm>
+        </p:spPr>
+      </p:pic>
+      <p:pic>
+        <p:nvPicPr>
+          <p:cNvPr id="13" name="Content Placeholder 4" descr="Unlink Mitigation">
+            <a:extLst>
+              <a:ext uri="{FF2B5EF4-FFF2-40B4-BE49-F238E27FC236}">
+                <a16:creationId xmlns:a16="http://schemas.microsoft.com/office/drawing/2014/main" id="{E2D7F700-5AD9-E749-A930-4450D98053D2}"/>
+              </a:ext>
+            </a:extLst>
+          </p:cNvPr>
+          <p:cNvPicPr>
+            <a:picLocks noChangeAspect="1"/>
+          </p:cNvPicPr>
+          <p:nvPr/>
+        </p:nvPicPr>
+        <p:blipFill>
+          <a:blip r:embed="rId3"/>
+          <a:stretch>
+            <a:fillRect/>
+          </a:stretch>
+        </p:blipFill>
+        <p:spPr>
+          <a:xfrm>
+            <a:off x="2195582" y="3995951"/>
+            <a:ext cx="6892446" cy="1120021"/>
+          </a:xfrm>
+          <a:prstGeom prst="rect">
+            <a:avLst/>
+          </a:prstGeom>
+          <a:noFill/>
         </p:spPr>
       </p:pic>
     </p:spTree>

</xml_diff>

<commit_message>
Slide work on intro to malloc, unlink and fd poison
* Remove unnecessary content
* Hide features not for DEFCON course
* Fd poison add slides for challenge1 mangling solution
</commit_message>
<xml_diff>
--- a/challenges/unlink/Unlink.pptx
+++ b/challenges/unlink/Unlink.pptx
@@ -6422,22 +6422,22 @@
         <a:lstStyle/>
         <a:p>
           <a:r>
-            <a:rPr lang="en-US"/>
+            <a:rPr lang="en-US" dirty="0"/>
             <a:t>Both </a:t>
           </a:r>
           <a:r>
-            <a:rPr lang="en-US" b="1"/>
+            <a:rPr lang="en-US" b="1" dirty="0"/>
             <a:t>below</a:t>
           </a:r>
           <a:r>
-            <a:rPr lang="en-US"/>
+            <a:rPr lang="en-US" dirty="0"/>
             <a:t> and </a:t>
           </a:r>
           <a:r>
-            <a:rPr lang="en-US" b="1"/>
+            <a:rPr lang="en-US" b="1" dirty="0"/>
             <a:t>above</a:t>
           </a:r>
-          <a:endParaRPr lang="en-US"/>
+          <a:endParaRPr lang="en-US" dirty="0"/>
         </a:p>
       </dgm:t>
     </dgm:pt>
@@ -6623,8 +6623,8 @@
         <a:lstStyle/>
         <a:p>
           <a:r>
-            <a:rPr lang="en-US"/>
-            <a:t>Add back into bins</a:t>
+            <a:rPr lang="en-US" dirty="0"/>
+            <a:t>Add new combined chunk back into a bin</a:t>
           </a:r>
         </a:p>
       </dgm:t>
@@ -9141,22 +9141,22 @@
             <a:buChar char="•"/>
           </a:pPr>
           <a:r>
-            <a:rPr lang="en-US" sz="2000" kern="1200"/>
+            <a:rPr lang="en-US" sz="2000" kern="1200" dirty="0"/>
             <a:t>Both </a:t>
           </a:r>
           <a:r>
-            <a:rPr lang="en-US" sz="2000" b="1" kern="1200"/>
+            <a:rPr lang="en-US" sz="2000" b="1" kern="1200" dirty="0"/>
             <a:t>below</a:t>
           </a:r>
           <a:r>
-            <a:rPr lang="en-US" sz="2000" kern="1200"/>
+            <a:rPr lang="en-US" sz="2000" kern="1200" dirty="0"/>
             <a:t> and </a:t>
           </a:r>
           <a:r>
-            <a:rPr lang="en-US" sz="2000" b="1" kern="1200"/>
+            <a:rPr lang="en-US" sz="2000" b="1" kern="1200" dirty="0"/>
             <a:t>above</a:t>
           </a:r>
-          <a:endParaRPr lang="en-US" sz="2000" kern="1200"/>
+          <a:endParaRPr lang="en-US" sz="2000" kern="1200" dirty="0"/>
         </a:p>
         <a:p>
           <a:pPr marL="228600" lvl="1" indent="-228600" algn="l" defTabSz="889000">
@@ -9405,8 +9405,8 @@
             <a:buChar char="•"/>
           </a:pPr>
           <a:r>
-            <a:rPr lang="en-US" sz="2000" kern="1200"/>
-            <a:t>Add back into bins</a:t>
+            <a:rPr lang="en-US" sz="2000" kern="1200" dirty="0"/>
+            <a:t>Add new combined chunk back into a bin</a:t>
           </a:r>
         </a:p>
       </dsp:txBody>
@@ -22172,7 +22172,7 @@
           <a:p>
             <a:fld id="{2DA23E8D-1792-1541-9147-970A8DD8A355}" type="datetimeFigureOut">
               <a:rPr lang="en-US" smtClean="0"/>
-              <a:t>5/25/21</a:t>
+              <a:t>6/1/21</a:t>
             </a:fld>
             <a:endParaRPr lang="en-US" dirty="0"/>
           </a:p>
@@ -22642,7 +22642,7 @@
                 <a:latin typeface="Calibri"/>
               </a:rPr>
               <a:pPr/>
-              <a:t>5/25/21</a:t>
+              <a:t>6/1/21</a:t>
             </a:fld>
             <a:endParaRPr lang="en-US" dirty="0">
               <a:solidFill>
@@ -22895,7 +22895,7 @@
                 <a:latin typeface="Calibri"/>
               </a:rPr>
               <a:pPr/>
-              <a:t>5/25/21</a:t>
+              <a:t>6/1/21</a:t>
             </a:fld>
             <a:endParaRPr lang="en-US" dirty="0">
               <a:solidFill>
@@ -23110,7 +23110,7 @@
                 <a:latin typeface="Calibri"/>
               </a:rPr>
               <a:pPr/>
-              <a:t>5/25/21</a:t>
+              <a:t>6/1/21</a:t>
             </a:fld>
             <a:endParaRPr lang="en-US" dirty="0">
               <a:solidFill>
@@ -23508,7 +23508,7 @@
                 <a:latin typeface="Calibri"/>
               </a:rPr>
               <a:pPr/>
-              <a:t>5/25/21</a:t>
+              <a:t>6/1/21</a:t>
             </a:fld>
             <a:endParaRPr lang="en-US" dirty="0">
               <a:solidFill>
@@ -23850,7 +23850,7 @@
                 <a:latin typeface="Calibri"/>
               </a:rPr>
               <a:pPr/>
-              <a:t>5/25/21</a:t>
+              <a:t>6/1/21</a:t>
             </a:fld>
             <a:endParaRPr lang="en-US" dirty="0">
               <a:solidFill>
@@ -24178,7 +24178,7 @@
                 <a:latin typeface="Calibri"/>
               </a:rPr>
               <a:pPr/>
-              <a:t>5/25/21</a:t>
+              <a:t>6/1/21</a:t>
             </a:fld>
             <a:endParaRPr lang="en-US" dirty="0">
               <a:solidFill>
@@ -24667,7 +24667,7 @@
                 <a:latin typeface="Calibri"/>
               </a:rPr>
               <a:pPr/>
-              <a:t>5/25/21</a:t>
+              <a:t>6/1/21</a:t>
             </a:fld>
             <a:endParaRPr lang="en-US" dirty="0">
               <a:solidFill>
@@ -24850,7 +24850,7 @@
                 <a:latin typeface="Calibri"/>
               </a:rPr>
               <a:pPr/>
-              <a:t>5/25/21</a:t>
+              <a:t>6/1/21</a:t>
             </a:fld>
             <a:endParaRPr lang="en-US" dirty="0">
               <a:solidFill>
@@ -25096,7 +25096,7 @@
                 <a:latin typeface="Calibri"/>
               </a:rPr>
               <a:pPr/>
-              <a:t>5/25/21</a:t>
+              <a:t>6/1/21</a:t>
             </a:fld>
             <a:endParaRPr lang="en-US" dirty="0">
               <a:solidFill>
@@ -25438,7 +25438,7 @@
                 <a:latin typeface="Calibri"/>
               </a:rPr>
               <a:pPr/>
-              <a:t>5/25/21</a:t>
+              <a:t>6/1/21</a:t>
             </a:fld>
             <a:endParaRPr lang="en-US" dirty="0">
               <a:solidFill>
@@ -25730,7 +25730,7 @@
                 <a:latin typeface="Calibri"/>
               </a:rPr>
               <a:pPr/>
-              <a:t>5/25/21</a:t>
+              <a:t>6/1/21</a:t>
             </a:fld>
             <a:endParaRPr lang="en-US" dirty="0">
               <a:solidFill>
@@ -25980,7 +25980,7 @@
                 <a:latin typeface="Calibri"/>
               </a:rPr>
               <a:pPr defTabSz="914400"/>
-              <a:t>5/25/21</a:t>
+              <a:t>6/1/21</a:t>
             </a:fld>
             <a:endParaRPr lang="en-US" dirty="0">
               <a:solidFill>
@@ -32441,7 +32441,7 @@
           <a:p>
             <a:r>
               <a:rPr lang="en-US" dirty="0"/>
-              <a:t>Writing to P-&gt;fd</a:t>
+              <a:t>Writing to P-&gt;bk</a:t>
             </a:r>
           </a:p>
           <a:p>
@@ -32451,13 +32451,13 @@
             </a:r>
             <a:r>
               <a:rPr lang="en-US" b="1" dirty="0"/>
-              <a:t>P + 0x10</a:t>
+              <a:t>P + 0x18</a:t>
             </a:r>
           </a:p>
           <a:p>
             <a:r>
               <a:rPr lang="en-US" dirty="0"/>
-              <a:t>P + 0x10 = P-&gt;fd</a:t>
+              <a:t>P + 0x18 = P-&gt;bk</a:t>
             </a:r>
           </a:p>
           <a:p>
@@ -35137,7 +35137,7 @@
               <a:t>For GOT, overwrite </a:t>
             </a:r>
             <a:r>
-              <a:rPr lang="en-US" i="1" dirty="0"/>
+              <a:rPr lang="en-US" b="1" i="1" dirty="0"/>
               <a:t>puts</a:t>
             </a:r>
             <a:r>
@@ -35155,7 +35155,7 @@
           <a:p>
             <a:r>
               <a:rPr lang="en-US" dirty="0"/>
-              <a:t>Address of Heap/Stack with Shellcode: </a:t>
+              <a:t>Address of Heap with Shellcode: </a:t>
             </a:r>
           </a:p>
           <a:p>
@@ -35359,7 +35359,7 @@
         </p:blipFill>
         <p:spPr>
           <a:xfrm>
-            <a:off x="145504" y="967376"/>
+            <a:off x="460058" y="953683"/>
             <a:ext cx="2625688" cy="2066116"/>
           </a:xfrm>
           <a:prstGeom prst="rect">
@@ -40724,7 +40724,7 @@
             <p:ph idx="1"/>
             <p:extLst>
               <p:ext uri="{D42A27DB-BD31-4B8C-83A1-F6EECF244321}">
-                <p14:modId xmlns:p14="http://schemas.microsoft.com/office/powerpoint/2010/main" val="1197027312"/>
+                <p14:modId xmlns:p14="http://schemas.microsoft.com/office/powerpoint/2010/main" val="2885620417"/>
               </p:ext>
             </p:extLst>
           </p:nvPr>
@@ -40739,36 +40739,6 @@
           </a:graphicData>
         </a:graphic>
       </p:graphicFrame>
-      <p:pic>
-        <p:nvPicPr>
-          <p:cNvPr id="4" name="Picture 3" descr="A screenshot of a cell phone&#10;&#10;Description automatically generated">
-            <a:extLst>
-              <a:ext uri="{FF2B5EF4-FFF2-40B4-BE49-F238E27FC236}">
-                <a16:creationId xmlns:a16="http://schemas.microsoft.com/office/drawing/2014/main" id="{63930DE7-404C-214A-948E-EBC79142BB31}"/>
-              </a:ext>
-            </a:extLst>
-          </p:cNvPr>
-          <p:cNvPicPr>
-            <a:picLocks noChangeAspect="1"/>
-          </p:cNvPicPr>
-          <p:nvPr/>
-        </p:nvPicPr>
-        <p:blipFill>
-          <a:blip r:embed="rId7"/>
-          <a:stretch>
-            <a:fillRect/>
-          </a:stretch>
-        </p:blipFill>
-        <p:spPr>
-          <a:xfrm>
-            <a:off x="7636967" y="398630"/>
-            <a:ext cx="1507033" cy="1675821"/>
-          </a:xfrm>
-          <a:prstGeom prst="rect">
-            <a:avLst/>
-          </a:prstGeom>
-        </p:spPr>
-      </p:pic>
     </p:spTree>
     <p:extLst>
       <p:ext uri="{BB962C8B-B14F-4D97-AF65-F5344CB8AC3E}">

</xml_diff>